<commit_message>
dubbo src study 修整2和3
</commit_message>
<xml_diff>
--- a/04.dubbo_demo/document/dubbo源码分析2-reference bean发起调用.pptx
+++ b/04.dubbo_demo/document/dubbo源码分析2-reference bean发起调用.pptx
@@ -5,10 +5,10 @@
     <p:sldMasterId id="2147483648" r:id="rId1"/>
   </p:sldMasterIdLst>
   <p:notesMasterIdLst>
-    <p:notesMasterId r:id="rId18"/>
+    <p:notesMasterId r:id="rId19"/>
   </p:notesMasterIdLst>
   <p:handoutMasterIdLst>
-    <p:handoutMasterId r:id="rId19"/>
+    <p:handoutMasterId r:id="rId20"/>
   </p:handoutMasterIdLst>
   <p:sldIdLst>
     <p:sldId id="258" r:id="rId2"/>
@@ -22,11 +22,12 @@
     <p:sldId id="275" r:id="rId10"/>
     <p:sldId id="279" r:id="rId11"/>
     <p:sldId id="280" r:id="rId12"/>
-    <p:sldId id="276" r:id="rId13"/>
-    <p:sldId id="281" r:id="rId14"/>
-    <p:sldId id="282" r:id="rId15"/>
-    <p:sldId id="272" r:id="rId16"/>
-    <p:sldId id="273" r:id="rId17"/>
+    <p:sldId id="283" r:id="rId13"/>
+    <p:sldId id="276" r:id="rId14"/>
+    <p:sldId id="281" r:id="rId15"/>
+    <p:sldId id="282" r:id="rId16"/>
+    <p:sldId id="272" r:id="rId17"/>
+    <p:sldId id="273" r:id="rId18"/>
   </p:sldIdLst>
   <p:sldSz cx="9144000" cy="6858000" type="screen4x3"/>
   <p:notesSz cx="6858000" cy="9144000"/>
@@ -210,7 +211,7 @@
           <a:p>
             <a:fld id="{A24470EC-9BB2-47C0-BC15-E1BE469E1A44}" type="datetimeFigureOut">
               <a:rPr lang="zh-CN" altLang="en-US" smtClean="0"/>
-              <a:t>2016/9/7</a:t>
+              <a:t>2016/9/17</a:t>
             </a:fld>
             <a:endParaRPr lang="zh-CN" altLang="en-US"/>
           </a:p>
@@ -375,7 +376,7 @@
           <a:p>
             <a:fld id="{CBBF4566-D28E-4F21-9CA6-C92C78680512}" type="datetimeFigureOut">
               <a:rPr lang="zh-CN" altLang="en-US" smtClean="0"/>
-              <a:t>2016/9/7</a:t>
+              <a:t>2016/9/17</a:t>
             </a:fld>
             <a:endParaRPr lang="zh-CN" altLang="en-US"/>
           </a:p>
@@ -828,7 +829,7 @@
           <a:p>
             <a:fld id="{FE514A0D-6246-45A0-AFCD-05CB06E3D75A}" type="datetime1">
               <a:rPr lang="zh-CN" altLang="en-US" smtClean="0"/>
-              <a:t>2016/9/7</a:t>
+              <a:t>2016/9/17</a:t>
             </a:fld>
             <a:endParaRPr lang="zh-CN" altLang="en-US" dirty="0"/>
           </a:p>
@@ -993,7 +994,7 @@
           <a:p>
             <a:fld id="{AE5463FA-5733-4E22-A176-CA0F8E59A78F}" type="datetime1">
               <a:rPr lang="zh-CN" altLang="en-US" smtClean="0"/>
-              <a:t>2016/9/7</a:t>
+              <a:t>2016/9/17</a:t>
             </a:fld>
             <a:endParaRPr lang="zh-CN" altLang="en-US"/>
           </a:p>
@@ -1168,7 +1169,7 @@
           <a:p>
             <a:fld id="{AB202E1E-E171-4D05-9995-782F74FA70A7}" type="datetime1">
               <a:rPr lang="zh-CN" altLang="en-US" smtClean="0"/>
-              <a:t>2016/9/7</a:t>
+              <a:t>2016/9/17</a:t>
             </a:fld>
             <a:endParaRPr lang="zh-CN" altLang="en-US"/>
           </a:p>
@@ -1333,7 +1334,7 @@
           <a:p>
             <a:fld id="{B34AA640-87DE-403B-AC78-F6FEE0B57B5D}" type="datetime1">
               <a:rPr lang="zh-CN" altLang="en-US" smtClean="0"/>
-              <a:t>2016/9/7</a:t>
+              <a:t>2016/9/17</a:t>
             </a:fld>
             <a:endParaRPr lang="zh-CN" altLang="en-US"/>
           </a:p>
@@ -1574,7 +1575,7 @@
           <a:p>
             <a:fld id="{A0663606-6224-48AC-A9C3-01536FF5A8D3}" type="datetime1">
               <a:rPr lang="zh-CN" altLang="en-US" smtClean="0"/>
-              <a:t>2016/9/7</a:t>
+              <a:t>2016/9/17</a:t>
             </a:fld>
             <a:endParaRPr lang="zh-CN" altLang="en-US"/>
           </a:p>
@@ -1857,7 +1858,7 @@
           <a:p>
             <a:fld id="{BCFAA94D-CC7D-4797-A37E-F6E45888FFD3}" type="datetime1">
               <a:rPr lang="zh-CN" altLang="en-US" smtClean="0"/>
-              <a:t>2016/9/7</a:t>
+              <a:t>2016/9/17</a:t>
             </a:fld>
             <a:endParaRPr lang="zh-CN" altLang="en-US"/>
           </a:p>
@@ -2274,7 +2275,7 @@
           <a:p>
             <a:fld id="{CB3D4EC1-D5F4-4EA7-BEE4-003887811976}" type="datetime1">
               <a:rPr lang="zh-CN" altLang="en-US" smtClean="0"/>
-              <a:t>2016/9/7</a:t>
+              <a:t>2016/9/17</a:t>
             </a:fld>
             <a:endParaRPr lang="zh-CN" altLang="en-US"/>
           </a:p>
@@ -2387,7 +2388,7 @@
           <a:p>
             <a:fld id="{A3F3B0D5-BEE7-46BD-8C3C-1F24935BD2BA}" type="datetime1">
               <a:rPr lang="zh-CN" altLang="en-US" smtClean="0"/>
-              <a:t>2016/9/7</a:t>
+              <a:t>2016/9/17</a:t>
             </a:fld>
             <a:endParaRPr lang="zh-CN" altLang="en-US"/>
           </a:p>
@@ -2477,7 +2478,7 @@
           <a:p>
             <a:fld id="{BAA94D51-A23F-4C7E-ACB9-F69CEC11A8FE}" type="datetime1">
               <a:rPr lang="zh-CN" altLang="en-US" smtClean="0"/>
-              <a:t>2016/9/7</a:t>
+              <a:t>2016/9/17</a:t>
             </a:fld>
             <a:endParaRPr lang="zh-CN" altLang="en-US"/>
           </a:p>
@@ -2749,7 +2750,7 @@
           <a:p>
             <a:fld id="{2F94AAA0-004A-44A7-9D1C-22721FA89EC0}" type="datetime1">
               <a:rPr lang="zh-CN" altLang="en-US" smtClean="0"/>
-              <a:t>2016/9/7</a:t>
+              <a:t>2016/9/17</a:t>
             </a:fld>
             <a:endParaRPr lang="zh-CN" altLang="en-US"/>
           </a:p>
@@ -2997,7 +2998,7 @@
           <a:p>
             <a:fld id="{F570CB73-500B-46CB-B603-E25A55C666EC}" type="datetime1">
               <a:rPr lang="zh-CN" altLang="en-US" smtClean="0"/>
-              <a:t>2016/9/7</a:t>
+              <a:t>2016/9/17</a:t>
             </a:fld>
             <a:endParaRPr lang="zh-CN" altLang="en-US"/>
           </a:p>
@@ -3219,7 +3220,7 @@
           <a:p>
             <a:fld id="{E708D0EF-A89D-41AA-A2B5-7C45C89333AE}" type="datetime1">
               <a:rPr lang="zh-CN" altLang="en-US" smtClean="0"/>
-              <a:t>2016/9/7</a:t>
+              <a:t>2016/9/17</a:t>
             </a:fld>
             <a:endParaRPr lang="zh-CN" altLang="en-US"/>
           </a:p>
@@ -3693,7 +3694,7 @@
           <a:p>
             <a:fld id="{DC0212C2-3CC8-4688-A0F8-3B0C9C548618}" type="datetime1">
               <a:rPr lang="zh-CN" altLang="en-US" smtClean="0"/>
-              <a:t>2016/9/7</a:t>
+              <a:t>2016/9/17</a:t>
             </a:fld>
             <a:endParaRPr lang="zh-CN" altLang="en-US" dirty="0"/>
           </a:p>
@@ -3896,7 +3897,7 @@
           <a:p>
             <a:fld id="{B34AA640-87DE-403B-AC78-F6FEE0B57B5D}" type="datetime1">
               <a:rPr lang="zh-CN" altLang="en-US" smtClean="0"/>
-              <a:t>2016/9/7</a:t>
+              <a:t>2016/9/17</a:t>
             </a:fld>
             <a:endParaRPr lang="zh-CN" altLang="en-US"/>
           </a:p>
@@ -4036,7 +4037,7 @@
           <a:p>
             <a:fld id="{B34AA640-87DE-403B-AC78-F6FEE0B57B5D}" type="datetime1">
               <a:rPr lang="zh-CN" altLang="en-US" smtClean="0"/>
-              <a:t>2016/9/7</a:t>
+              <a:t>2016/9/17</a:t>
             </a:fld>
             <a:endParaRPr lang="zh-CN" altLang="en-US"/>
           </a:p>
@@ -4159,8 +4160,16 @@
           <a:lstStyle/>
           <a:p>
             <a:r>
-              <a:rPr lang="zh-CN" altLang="en-US" dirty="0" smtClean="0"/>
-              <a:t>调用返回的结果如何处理</a:t>
+              <a:rPr lang="zh-CN" altLang="en-US" dirty="0"/>
+              <a:t>调用的请求如何编</a:t>
+            </a:r>
+            <a:r>
+              <a:rPr lang="zh-CN" altLang="en-US" dirty="0" smtClean="0"/>
+              <a:t>码</a:t>
+            </a:r>
+            <a:r>
+              <a:rPr lang="en-US" altLang="zh-CN" dirty="0" smtClean="0"/>
+              <a:t>4</a:t>
             </a:r>
             <a:endParaRPr lang="zh-CN" altLang="en-US" dirty="0"/>
           </a:p>
@@ -4168,139 +4177,6 @@
       </p:sp>
       <p:sp>
         <p:nvSpPr>
-          <p:cNvPr id="3" name="内容占位符 2"/>
-          <p:cNvSpPr>
-            <a:spLocks noGrp="1"/>
-          </p:cNvSpPr>
-          <p:nvPr>
-            <p:ph idx="1"/>
-          </p:nvPr>
-        </p:nvSpPr>
-        <p:spPr/>
-        <p:txBody>
-          <a:bodyPr/>
-          <a:lstStyle/>
-          <a:p>
-            <a:r>
-              <a:rPr lang="en-US" altLang="zh-CN" dirty="0"/>
-              <a:t>Test case </a:t>
-            </a:r>
-            <a:r>
-              <a:rPr lang="en-US" altLang="zh-CN" sz="1600" dirty="0"/>
-              <a:t>org.simonme.dubbo.demo.consumer.registercenter.zookeeper.UserClientTest.testQueryUser</a:t>
-            </a:r>
-            <a:r>
-              <a:rPr lang="en-US" altLang="zh-CN" sz="1600" dirty="0" smtClean="0"/>
-              <a:t>()</a:t>
-            </a:r>
-          </a:p>
-          <a:p>
-            <a:r>
-              <a:rPr lang="zh-CN" altLang="en-US" dirty="0" smtClean="0"/>
-              <a:t>注意对</a:t>
-            </a:r>
-            <a:r>
-              <a:rPr lang="en-US" altLang="zh-CN" dirty="0" smtClean="0"/>
-              <a:t>service</a:t>
-            </a:r>
-            <a:r>
-              <a:rPr lang="zh-CN" altLang="en-US" dirty="0" smtClean="0"/>
-              <a:t>配置设置</a:t>
-            </a:r>
-            <a:r>
-              <a:rPr lang="en-US" altLang="zh-CN" dirty="0" smtClean="0"/>
-              <a:t>timeout </a:t>
-            </a:r>
-            <a:r>
-              <a:rPr lang="zh-CN" altLang="en-US" dirty="0" smtClean="0"/>
-              <a:t>否则</a:t>
-            </a:r>
-            <a:r>
-              <a:rPr lang="zh-CN" altLang="en-US" dirty="0"/>
-              <a:t>默</a:t>
-            </a:r>
-            <a:r>
-              <a:rPr lang="zh-CN" altLang="en-US" dirty="0" smtClean="0"/>
-              <a:t>认</a:t>
-            </a:r>
-            <a:r>
-              <a:rPr lang="en-US" altLang="zh-CN" dirty="0" smtClean="0"/>
-              <a:t>1s</a:t>
-            </a:r>
-            <a:r>
-              <a:rPr lang="zh-CN" altLang="en-US" dirty="0" smtClean="0"/>
-              <a:t>超时 不方便调试</a:t>
-            </a:r>
-            <a:endParaRPr lang="en-US" altLang="zh-CN" dirty="0" smtClean="0"/>
-          </a:p>
-          <a:p>
-            <a:r>
-              <a:rPr lang="zh-CN" altLang="en-US" dirty="0" smtClean="0"/>
-              <a:t>返回值类型</a:t>
-            </a:r>
-            <a:r>
-              <a:rPr lang="en-US" altLang="zh-CN" dirty="0" smtClean="0"/>
-              <a:t>(User)</a:t>
-            </a:r>
-            <a:r>
-              <a:rPr lang="zh-CN" altLang="en-US" dirty="0" smtClean="0"/>
-              <a:t>需要实现序列接口</a:t>
-            </a:r>
-            <a:endParaRPr lang="en-US" altLang="zh-CN" dirty="0" smtClean="0"/>
-          </a:p>
-          <a:p>
-            <a:r>
-              <a:rPr lang="zh-CN" altLang="en-US" dirty="0"/>
-              <a:t>编</a:t>
-            </a:r>
-            <a:r>
-              <a:rPr lang="zh-CN" altLang="en-US" dirty="0" smtClean="0"/>
-              <a:t>码：</a:t>
-            </a:r>
-            <a:r>
-              <a:rPr lang="en-US" altLang="zh-CN" dirty="0"/>
-              <a:t> </a:t>
-            </a:r>
-            <a:r>
-              <a:rPr lang="en-US" altLang="zh-CN" sz="1600" dirty="0" err="1" smtClean="0"/>
-              <a:t>DubboCodec.encodeResponseData</a:t>
-            </a:r>
-            <a:r>
-              <a:rPr lang="en-US" altLang="zh-CN" dirty="0" smtClean="0"/>
-              <a:t> </a:t>
-            </a:r>
-            <a:r>
-              <a:rPr lang="zh-CN" altLang="en-US" dirty="0" smtClean="0"/>
-              <a:t>服务侧</a:t>
-            </a:r>
-            <a:endParaRPr lang="en-US" altLang="zh-CN" dirty="0" smtClean="0"/>
-          </a:p>
-          <a:p>
-            <a:r>
-              <a:rPr lang="zh-CN" altLang="en-US" dirty="0"/>
-              <a:t>结</a:t>
-            </a:r>
-            <a:r>
-              <a:rPr lang="zh-CN" altLang="en-US" dirty="0" smtClean="0"/>
-              <a:t>果封装类：</a:t>
-            </a:r>
-            <a:r>
-              <a:rPr lang="en-US" altLang="zh-CN" dirty="0"/>
-              <a:t> </a:t>
-            </a:r>
-            <a:r>
-              <a:rPr lang="en-US" altLang="zh-CN" dirty="0" err="1" smtClean="0"/>
-              <a:t>DecodeableRpcResult</a:t>
-            </a:r>
-            <a:endParaRPr lang="en-US" altLang="zh-CN" dirty="0" smtClean="0"/>
-          </a:p>
-          <a:p>
-            <a:endParaRPr lang="zh-CN" altLang="en-US" dirty="0"/>
-          </a:p>
-        </p:txBody>
-      </p:sp>
-      <p:sp>
-        <p:nvSpPr>
           <p:cNvPr id="4" name="日期占位符 3"/>
           <p:cNvSpPr>
             <a:spLocks noGrp="1"/>
@@ -4316,7 +4192,7 @@
           <a:p>
             <a:fld id="{B34AA640-87DE-403B-AC78-F6FEE0B57B5D}" type="datetime1">
               <a:rPr lang="zh-CN" altLang="en-US" smtClean="0"/>
-              <a:t>2016/9/7</a:t>
+              <a:t>2016/9/17</a:t>
             </a:fld>
             <a:endParaRPr lang="zh-CN" altLang="en-US"/>
           </a:p>
@@ -4345,10 +4221,39 @@
           </a:p>
         </p:txBody>
       </p:sp>
+      <p:pic>
+        <p:nvPicPr>
+          <p:cNvPr id="8" name="内容占位符 7"/>
+          <p:cNvPicPr>
+            <a:picLocks noGrp="1" noChangeAspect="1"/>
+          </p:cNvPicPr>
+          <p:nvPr>
+            <p:ph idx="1"/>
+          </p:nvPr>
+        </p:nvPicPr>
+        <p:blipFill>
+          <a:blip r:embed="rId2">
+            <a:extLst>
+              <a:ext uri="{28A0092B-C50C-407E-A947-70E740481C1C}">
+                <a14:useLocalDpi xmlns:a14="http://schemas.microsoft.com/office/drawing/2010/main" val="0"/>
+              </a:ext>
+            </a:extLst>
+          </a:blip>
+          <a:stretch>
+            <a:fillRect/>
+          </a:stretch>
+        </p:blipFill>
+        <p:spPr>
+          <a:xfrm>
+            <a:off x="179512" y="1268760"/>
+            <a:ext cx="7992888" cy="5398224"/>
+          </a:xfrm>
+        </p:spPr>
+      </p:pic>
     </p:spTree>
     <p:extLst>
       <p:ext uri="{BB962C8B-B14F-4D97-AF65-F5344CB8AC3E}">
-        <p14:creationId xmlns:p14="http://schemas.microsoft.com/office/powerpoint/2010/main" val="2832579571"/>
+        <p14:creationId xmlns:p14="http://schemas.microsoft.com/office/powerpoint/2010/main" val="3156979279"/>
       </p:ext>
     </p:extLst>
   </p:cSld>
@@ -4394,6 +4299,245 @@
         </p:nvSpPr>
         <p:spPr/>
         <p:txBody>
+          <a:bodyPr/>
+          <a:lstStyle/>
+          <a:p>
+            <a:r>
+              <a:rPr lang="zh-CN" altLang="en-US" dirty="0" smtClean="0"/>
+              <a:t>调用返回的结果如何处理</a:t>
+            </a:r>
+            <a:endParaRPr lang="zh-CN" altLang="en-US" dirty="0"/>
+          </a:p>
+        </p:txBody>
+      </p:sp>
+      <p:sp>
+        <p:nvSpPr>
+          <p:cNvPr id="3" name="内容占位符 2"/>
+          <p:cNvSpPr>
+            <a:spLocks noGrp="1"/>
+          </p:cNvSpPr>
+          <p:nvPr>
+            <p:ph idx="1"/>
+          </p:nvPr>
+        </p:nvSpPr>
+        <p:spPr/>
+        <p:txBody>
+          <a:bodyPr/>
+          <a:lstStyle/>
+          <a:p>
+            <a:r>
+              <a:rPr lang="en-US" altLang="zh-CN" dirty="0"/>
+              <a:t>Test case </a:t>
+            </a:r>
+            <a:r>
+              <a:rPr lang="en-US" altLang="zh-CN" sz="1600" dirty="0"/>
+              <a:t>org.simonme.dubbo.demo.consumer.registercenter.zookeeper.UserClientTest.testQueryUser</a:t>
+            </a:r>
+            <a:r>
+              <a:rPr lang="en-US" altLang="zh-CN" sz="1600" dirty="0" smtClean="0"/>
+              <a:t>()</a:t>
+            </a:r>
+          </a:p>
+          <a:p>
+            <a:r>
+              <a:rPr lang="zh-CN" altLang="en-US" dirty="0" smtClean="0"/>
+              <a:t>注意对</a:t>
+            </a:r>
+            <a:r>
+              <a:rPr lang="en-US" altLang="zh-CN" dirty="0" smtClean="0"/>
+              <a:t>service</a:t>
+            </a:r>
+            <a:r>
+              <a:rPr lang="zh-CN" altLang="en-US" dirty="0" smtClean="0"/>
+              <a:t>配置设置</a:t>
+            </a:r>
+            <a:r>
+              <a:rPr lang="en-US" altLang="zh-CN" dirty="0" smtClean="0"/>
+              <a:t>timeout </a:t>
+            </a:r>
+            <a:r>
+              <a:rPr lang="zh-CN" altLang="en-US" dirty="0" smtClean="0"/>
+              <a:t>否则</a:t>
+            </a:r>
+            <a:r>
+              <a:rPr lang="zh-CN" altLang="en-US" dirty="0"/>
+              <a:t>默</a:t>
+            </a:r>
+            <a:r>
+              <a:rPr lang="zh-CN" altLang="en-US" dirty="0" smtClean="0"/>
+              <a:t>认</a:t>
+            </a:r>
+            <a:r>
+              <a:rPr lang="en-US" altLang="zh-CN" dirty="0" smtClean="0"/>
+              <a:t>1s</a:t>
+            </a:r>
+            <a:r>
+              <a:rPr lang="zh-CN" altLang="en-US" dirty="0" smtClean="0"/>
+              <a:t>超时 不方便调试</a:t>
+            </a:r>
+            <a:endParaRPr lang="en-US" altLang="zh-CN" dirty="0" smtClean="0"/>
+          </a:p>
+          <a:p>
+            <a:r>
+              <a:rPr lang="zh-CN" altLang="en-US" dirty="0" smtClean="0"/>
+              <a:t>返回值类型</a:t>
+            </a:r>
+            <a:r>
+              <a:rPr lang="en-US" altLang="zh-CN" dirty="0" smtClean="0"/>
+              <a:t>(User)</a:t>
+            </a:r>
+            <a:r>
+              <a:rPr lang="zh-CN" altLang="en-US" dirty="0" smtClean="0"/>
+              <a:t>需要实现序列接口</a:t>
+            </a:r>
+            <a:endParaRPr lang="en-US" altLang="zh-CN" dirty="0" smtClean="0"/>
+          </a:p>
+          <a:p>
+            <a:r>
+              <a:rPr lang="zh-CN" altLang="en-US" dirty="0"/>
+              <a:t>编</a:t>
+            </a:r>
+            <a:r>
+              <a:rPr lang="zh-CN" altLang="en-US" dirty="0" smtClean="0"/>
+              <a:t>码：</a:t>
+            </a:r>
+            <a:r>
+              <a:rPr lang="en-US" altLang="zh-CN" dirty="0"/>
+              <a:t> </a:t>
+            </a:r>
+            <a:r>
+              <a:rPr lang="en-US" altLang="zh-CN" sz="1600" dirty="0" err="1" smtClean="0"/>
+              <a:t>DubboCodec.encodeResponseData</a:t>
+            </a:r>
+            <a:r>
+              <a:rPr lang="en-US" altLang="zh-CN" dirty="0" smtClean="0"/>
+              <a:t> </a:t>
+            </a:r>
+            <a:r>
+              <a:rPr lang="zh-CN" altLang="en-US" dirty="0" smtClean="0"/>
+              <a:t>服务侧</a:t>
+            </a:r>
+            <a:endParaRPr lang="en-US" altLang="zh-CN" dirty="0" smtClean="0"/>
+          </a:p>
+          <a:p>
+            <a:r>
+              <a:rPr lang="zh-CN" altLang="en-US" dirty="0"/>
+              <a:t>结</a:t>
+            </a:r>
+            <a:r>
+              <a:rPr lang="zh-CN" altLang="en-US" dirty="0" smtClean="0"/>
+              <a:t>果封装类：</a:t>
+            </a:r>
+            <a:r>
+              <a:rPr lang="en-US" altLang="zh-CN" dirty="0"/>
+              <a:t> </a:t>
+            </a:r>
+            <a:r>
+              <a:rPr lang="en-US" altLang="zh-CN" dirty="0" err="1" smtClean="0"/>
+              <a:t>DecodeableRpcResult</a:t>
+            </a:r>
+            <a:endParaRPr lang="en-US" altLang="zh-CN" dirty="0" smtClean="0"/>
+          </a:p>
+          <a:p>
+            <a:endParaRPr lang="zh-CN" altLang="en-US" dirty="0"/>
+          </a:p>
+        </p:txBody>
+      </p:sp>
+      <p:sp>
+        <p:nvSpPr>
+          <p:cNvPr id="4" name="日期占位符 3"/>
+          <p:cNvSpPr>
+            <a:spLocks noGrp="1"/>
+          </p:cNvSpPr>
+          <p:nvPr>
+            <p:ph type="dt" sz="half" idx="10"/>
+          </p:nvPr>
+        </p:nvSpPr>
+        <p:spPr/>
+        <p:txBody>
+          <a:bodyPr/>
+          <a:lstStyle/>
+          <a:p>
+            <a:fld id="{B34AA640-87DE-403B-AC78-F6FEE0B57B5D}" type="datetime1">
+              <a:rPr lang="zh-CN" altLang="en-US" smtClean="0"/>
+              <a:t>2016/9/17</a:t>
+            </a:fld>
+            <a:endParaRPr lang="zh-CN" altLang="en-US"/>
+          </a:p>
+        </p:txBody>
+      </p:sp>
+      <p:sp>
+        <p:nvSpPr>
+          <p:cNvPr id="5" name="灯片编号占位符 4"/>
+          <p:cNvSpPr>
+            <a:spLocks noGrp="1"/>
+          </p:cNvSpPr>
+          <p:nvPr>
+            <p:ph type="sldNum" sz="quarter" idx="12"/>
+          </p:nvPr>
+        </p:nvSpPr>
+        <p:spPr/>
+        <p:txBody>
+          <a:bodyPr/>
+          <a:lstStyle/>
+          <a:p>
+            <a:fld id="{0C913308-F349-4B6D-A68A-DD1791B4A57B}" type="slidenum">
+              <a:rPr lang="zh-CN" altLang="en-US" smtClean="0"/>
+              <a:t>13</a:t>
+            </a:fld>
+            <a:endParaRPr lang="zh-CN" altLang="en-US"/>
+          </a:p>
+        </p:txBody>
+      </p:sp>
+    </p:spTree>
+    <p:extLst>
+      <p:ext uri="{BB962C8B-B14F-4D97-AF65-F5344CB8AC3E}">
+        <p14:creationId xmlns:p14="http://schemas.microsoft.com/office/powerpoint/2010/main" val="2832579571"/>
+      </p:ext>
+    </p:extLst>
+  </p:cSld>
+  <p:clrMapOvr>
+    <a:masterClrMapping/>
+  </p:clrMapOvr>
+  <p:timing>
+    <p:tnLst>
+      <p:par>
+        <p:cTn id="1" dur="indefinite" restart="never" nodeType="tmRoot"/>
+      </p:par>
+    </p:tnLst>
+  </p:timing>
+</p:sld>
+</file>
+
+<file path=ppt/slides/slide14.xml><?xml version="1.0" encoding="utf-8"?>
+<p:sld xmlns:a="http://schemas.openxmlformats.org/drawingml/2006/main" xmlns:r="http://schemas.openxmlformats.org/officeDocument/2006/relationships" xmlns:p="http://schemas.openxmlformats.org/presentationml/2006/main">
+  <p:cSld>
+    <p:spTree>
+      <p:nvGrpSpPr>
+        <p:cNvPr id="1" name=""/>
+        <p:cNvGrpSpPr/>
+        <p:nvPr/>
+      </p:nvGrpSpPr>
+      <p:grpSpPr>
+        <a:xfrm>
+          <a:off x="0" y="0"/>
+          <a:ext cx="0" cy="0"/>
+          <a:chOff x="0" y="0"/>
+          <a:chExt cx="0" cy="0"/>
+        </a:xfrm>
+      </p:grpSpPr>
+      <p:sp>
+        <p:nvSpPr>
+          <p:cNvPr id="2" name="标题 1"/>
+          <p:cNvSpPr>
+            <a:spLocks noGrp="1"/>
+          </p:cNvSpPr>
+          <p:nvPr>
+            <p:ph type="title"/>
+          </p:nvPr>
+        </p:nvSpPr>
+        <p:spPr/>
+        <p:txBody>
           <a:bodyPr>
             <a:normAutofit fontScale="90000"/>
           </a:bodyPr>
@@ -4542,7 +4686,7 @@
           <a:p>
             <a:fld id="{B34AA640-87DE-403B-AC78-F6FEE0B57B5D}" type="datetime1">
               <a:rPr lang="zh-CN" altLang="en-US" smtClean="0"/>
-              <a:t>2016/9/7</a:t>
+              <a:t>2016/9/17</a:t>
             </a:fld>
             <a:endParaRPr lang="zh-CN" altLang="en-US"/>
           </a:p>
@@ -4565,7 +4709,7 @@
           <a:p>
             <a:fld id="{0C913308-F349-4B6D-A68A-DD1791B4A57B}" type="slidenum">
               <a:rPr lang="zh-CN" altLang="en-US" smtClean="0"/>
-              <a:t>13</a:t>
+              <a:t>14</a:t>
             </a:fld>
             <a:endParaRPr lang="zh-CN" altLang="en-US"/>
           </a:p>
@@ -4673,7 +4817,7 @@
 </p:sld>
 </file>
 
-<file path=ppt/slides/slide14.xml><?xml version="1.0" encoding="utf-8"?>
+<file path=ppt/slides/slide15.xml><?xml version="1.0" encoding="utf-8"?>
 <p:sld xmlns:a="http://schemas.openxmlformats.org/drawingml/2006/main" xmlns:r="http://schemas.openxmlformats.org/officeDocument/2006/relationships" xmlns:p="http://schemas.openxmlformats.org/presentationml/2006/main">
   <p:cSld>
     <p:spTree>
@@ -4770,11 +4914,7 @@
             </a:r>
             <a:r>
               <a:rPr lang="zh-CN" altLang="en-US" dirty="0" smtClean="0"/>
-              <a:t>做了等</a:t>
-            </a:r>
-            <a:r>
-              <a:rPr lang="zh-CN" altLang="en-US" dirty="0" smtClean="0"/>
-              <a:t>待</a:t>
+              <a:t>做了等待</a:t>
             </a:r>
             <a:endParaRPr lang="en-US" altLang="zh-CN" dirty="0" smtClean="0"/>
           </a:p>
@@ -4937,7 +5077,7 @@
           <a:p>
             <a:fld id="{B34AA640-87DE-403B-AC78-F6FEE0B57B5D}" type="datetime1">
               <a:rPr lang="zh-CN" altLang="en-US" smtClean="0"/>
-              <a:t>2016/9/7</a:t>
+              <a:t>2016/9/17</a:t>
             </a:fld>
             <a:endParaRPr lang="zh-CN" altLang="en-US"/>
           </a:p>
@@ -4960,7 +5100,7 @@
           <a:p>
             <a:fld id="{0C913308-F349-4B6D-A68A-DD1791B4A57B}" type="slidenum">
               <a:rPr lang="zh-CN" altLang="en-US" smtClean="0"/>
-              <a:t>14</a:t>
+              <a:t>15</a:t>
             </a:fld>
             <a:endParaRPr lang="zh-CN" altLang="en-US"/>
           </a:p>
@@ -5027,7 +5167,7 @@
 </p:sld>
 </file>
 
-<file path=ppt/slides/slide15.xml><?xml version="1.0" encoding="utf-8"?>
+<file path=ppt/slides/slide16.xml><?xml version="1.0" encoding="utf-8"?>
 <p:sld xmlns:a="http://schemas.openxmlformats.org/drawingml/2006/main" xmlns:r="http://schemas.openxmlformats.org/officeDocument/2006/relationships" xmlns:p="http://schemas.openxmlformats.org/presentationml/2006/main">
   <p:cSld>
     <p:spTree>
@@ -5177,7 +5317,7 @@
           <a:p>
             <a:fld id="{B34AA640-87DE-403B-AC78-F6FEE0B57B5D}" type="datetime1">
               <a:rPr lang="zh-CN" altLang="en-US" smtClean="0"/>
-              <a:t>2016/9/7</a:t>
+              <a:t>2016/9/17</a:t>
             </a:fld>
             <a:endParaRPr lang="zh-CN" altLang="en-US"/>
           </a:p>
@@ -5200,7 +5340,7 @@
           <a:p>
             <a:fld id="{0C913308-F349-4B6D-A68A-DD1791B4A57B}" type="slidenum">
               <a:rPr lang="zh-CN" altLang="en-US" smtClean="0"/>
-              <a:t>15</a:t>
+              <a:t>16</a:t>
             </a:fld>
             <a:endParaRPr lang="zh-CN" altLang="en-US"/>
           </a:p>
@@ -5360,7 +5500,7 @@
 </p:sld>
 </file>
 
-<file path=ppt/slides/slide16.xml><?xml version="1.0" encoding="utf-8"?>
+<file path=ppt/slides/slide17.xml><?xml version="1.0" encoding="utf-8"?>
 <p:sld xmlns:a="http://schemas.openxmlformats.org/drawingml/2006/main" xmlns:r="http://schemas.openxmlformats.org/officeDocument/2006/relationships" xmlns:p="http://schemas.openxmlformats.org/presentationml/2006/main">
   <p:cSld>
     <p:spTree>
@@ -5429,19 +5569,90 @@
             </a:r>
             <a:r>
               <a:rPr lang="zh-CN" altLang="en-US" dirty="0" smtClean="0"/>
-              <a:t>实例创建的调用堆栈发现再回</a:t>
+              <a:t>实例创建的调用堆栈分析</a:t>
+            </a:r>
+            <a:endParaRPr lang="en-US" altLang="zh-CN" dirty="0" smtClean="0"/>
+          </a:p>
+          <a:p>
+            <a:r>
+              <a:rPr lang="en-US" altLang="zh-CN" dirty="0" err="1" smtClean="0"/>
+              <a:t>ProtocolFilterWrapper.buildInvokerChain</a:t>
             </a:r>
             <a:r>
               <a:rPr lang="en-US" altLang="zh-CN" dirty="0" smtClean="0"/>
-              <a:t>reference bean</a:t>
-            </a:r>
-            <a:r>
-              <a:rPr lang="zh-CN" altLang="en-US" dirty="0" smtClean="0"/>
-              <a:t>创建处分析</a:t>
+              <a:t> </a:t>
+            </a:r>
+            <a:r>
+              <a:rPr lang="zh-CN" altLang="en-US" dirty="0" smtClean="0"/>
+              <a:t>是</a:t>
+            </a:r>
+            <a:r>
+              <a:rPr lang="zh-CN" altLang="en-US" dirty="0" smtClean="0">
+                <a:solidFill>
+                  <a:srgbClr val="669800"/>
+                </a:solidFill>
+              </a:rPr>
+              <a:t>如何实现链</a:t>
+            </a:r>
+            <a:r>
+              <a:rPr lang="zh-CN" altLang="en-US" dirty="0" smtClean="0"/>
+              <a:t>的</a:t>
             </a:r>
             <a:endParaRPr lang="en-US" altLang="zh-CN" dirty="0" smtClean="0"/>
           </a:p>
           <a:p>
+            <a:pPr lvl="1"/>
+            <a:r>
+              <a:rPr lang="zh-CN" altLang="en-US" dirty="0" smtClean="0"/>
+              <a:t>迭代</a:t>
+            </a:r>
+            <a:r>
+              <a:rPr lang="en-US" altLang="zh-CN" dirty="0" smtClean="0"/>
+              <a:t>filters</a:t>
+            </a:r>
+            <a:r>
+              <a:rPr lang="zh-CN" altLang="en-US" dirty="0" smtClean="0"/>
+              <a:t>并调用其</a:t>
+            </a:r>
+            <a:r>
+              <a:rPr lang="en-US" altLang="zh-CN" dirty="0" smtClean="0"/>
+              <a:t>invoke</a:t>
+            </a:r>
+            <a:r>
+              <a:rPr lang="zh-CN" altLang="en-US" dirty="0"/>
+              <a:t>方法</a:t>
+            </a:r>
+            <a:r>
+              <a:rPr lang="zh-CN" altLang="en-US" dirty="0" smtClean="0"/>
+              <a:t>、</a:t>
+            </a:r>
+            <a:r>
+              <a:rPr lang="en-US" altLang="zh-CN" dirty="0" smtClean="0"/>
+              <a:t>Invoker</a:t>
+            </a:r>
+            <a:r>
+              <a:rPr lang="zh-CN" altLang="en-US" dirty="0" smtClean="0"/>
+              <a:t>的</a:t>
+            </a:r>
+            <a:r>
+              <a:rPr lang="zh-CN" altLang="en-US" dirty="0" smtClean="0">
+                <a:solidFill>
+                  <a:srgbClr val="669800"/>
+                </a:solidFill>
+              </a:rPr>
+              <a:t>匿名内部类配合外围变量</a:t>
+            </a:r>
+            <a:r>
+              <a:rPr lang="en-US" altLang="zh-CN" dirty="0" smtClean="0"/>
+              <a:t>next </a:t>
+            </a:r>
+            <a:r>
+              <a:rPr lang="zh-CN" altLang="en-US" dirty="0" smtClean="0"/>
+              <a:t>的使用 形成链路</a:t>
+            </a:r>
+            <a:endParaRPr lang="en-US" altLang="zh-CN" dirty="0" smtClean="0"/>
+          </a:p>
+          <a:p>
             <a:endParaRPr lang="zh-CN" altLang="en-US" dirty="0"/>
           </a:p>
         </p:txBody>
@@ -5463,7 +5674,7 @@
           <a:p>
             <a:fld id="{B34AA640-87DE-403B-AC78-F6FEE0B57B5D}" type="datetime1">
               <a:rPr lang="zh-CN" altLang="en-US" smtClean="0"/>
-              <a:t>2016/9/7</a:t>
+              <a:t>2016/9/17</a:t>
             </a:fld>
             <a:endParaRPr lang="zh-CN" altLang="en-US"/>
           </a:p>
@@ -5486,7 +5697,7 @@
           <a:p>
             <a:fld id="{0C913308-F349-4B6D-A68A-DD1791B4A57B}" type="slidenum">
               <a:rPr lang="zh-CN" altLang="en-US" smtClean="0"/>
-              <a:t>16</a:t>
+              <a:t>17</a:t>
             </a:fld>
             <a:endParaRPr lang="zh-CN" altLang="en-US"/>
           </a:p>
@@ -6360,7 +6571,7 @@
           <a:p>
             <a:fld id="{9F5F70F1-CB5D-4B93-BC1F-645497FA59B9}" type="datetime1">
               <a:rPr lang="zh-CN" altLang="en-US" smtClean="0"/>
-              <a:t>2016/9/7</a:t>
+              <a:t>2016/9/17</a:t>
             </a:fld>
             <a:endParaRPr lang="zh-CN" altLang="en-US"/>
           </a:p>
@@ -7106,7 +7317,7 @@
           <a:p>
             <a:fld id="{A75E0B93-03BC-460F-9D5A-2E2449B501CF}" type="datetime1">
               <a:rPr lang="zh-CN" altLang="en-US" smtClean="0"/>
-              <a:t>2016/9/7</a:t>
+              <a:t>2016/9/17</a:t>
             </a:fld>
             <a:endParaRPr lang="zh-CN" altLang="en-US"/>
           </a:p>
@@ -7496,12 +7707,68 @@
                   </a:schemeClr>
                 </a:solidFill>
               </a:rPr>
-              <a:t> line76</a:t>
+              <a:t> </a:t>
+            </a:r>
+            <a:r>
+              <a:rPr lang="en-US" altLang="zh-CN" sz="1900" dirty="0" smtClean="0">
+                <a:solidFill>
+                  <a:schemeClr val="tx2">
+                    <a:lumMod val="60000"/>
+                    <a:lumOff val="40000"/>
+                  </a:schemeClr>
+                </a:solidFill>
+              </a:rPr>
+              <a:t>line75</a:t>
+            </a:r>
+            <a:r>
+              <a:rPr lang="zh-CN" altLang="en-US" sz="1900" dirty="0" smtClean="0">
+                <a:solidFill>
+                  <a:schemeClr val="tx2">
+                    <a:lumMod val="60000"/>
+                    <a:lumOff val="40000"/>
+                  </a:schemeClr>
+                </a:solidFill>
+              </a:rPr>
+              <a:t>，</a:t>
+            </a:r>
+            <a:r>
+              <a:rPr lang="en-US" altLang="zh-CN" sz="1900" dirty="0" smtClean="0">
+                <a:solidFill>
+                  <a:schemeClr val="tx2">
+                    <a:lumMod val="60000"/>
+                    <a:lumOff val="40000"/>
+                  </a:schemeClr>
+                </a:solidFill>
+              </a:rPr>
+              <a:t>91</a:t>
+            </a:r>
+            <a:r>
+              <a:rPr lang="en-US" altLang="zh-CN" sz="1900" dirty="0" smtClean="0">
+                <a:solidFill>
+                  <a:schemeClr val="tx2">
+                    <a:lumMod val="60000"/>
+                    <a:lumOff val="40000"/>
+                  </a:schemeClr>
+                </a:solidFill>
+              </a:rPr>
+              <a:t>,</a:t>
+            </a:r>
+            <a:r>
+              <a:rPr lang="zh-CN" altLang="en-US" sz="1900" dirty="0" smtClean="0">
+                <a:solidFill>
+                  <a:schemeClr val="tx2">
+                    <a:lumMod val="60000"/>
+                    <a:lumOff val="40000"/>
+                  </a:schemeClr>
+                </a:solidFill>
+              </a:rPr>
+              <a:t>后面有详细介绍</a:t>
             </a:r>
             <a:r>
               <a:rPr lang="en-US" altLang="zh-CN" dirty="0" smtClean="0"/>
               <a:t>)</a:t>
             </a:r>
+            <a:endParaRPr lang="en-US" altLang="zh-CN" dirty="0" smtClean="0"/>
           </a:p>
           <a:p>
             <a:r>
@@ -7559,7 +7826,7 @@
           <a:p>
             <a:fld id="{B34AA640-87DE-403B-AC78-F6FEE0B57B5D}" type="datetime1">
               <a:rPr lang="zh-CN" altLang="en-US" smtClean="0"/>
-              <a:t>2016/9/7</a:t>
+              <a:t>2016/9/17</a:t>
             </a:fld>
             <a:endParaRPr lang="zh-CN" altLang="en-US"/>
           </a:p>
@@ -7746,7 +8013,7 @@
           <a:p>
             <a:fld id="{B34AA640-87DE-403B-AC78-F6FEE0B57B5D}" type="datetime1">
               <a:rPr lang="zh-CN" altLang="en-US" smtClean="0"/>
-              <a:t>2016/9/7</a:t>
+              <a:t>2016/9/17</a:t>
             </a:fld>
             <a:endParaRPr lang="zh-CN" altLang="en-US"/>
           </a:p>
@@ -7963,7 +8230,7 @@
           <a:p>
             <a:fld id="{B34AA640-87DE-403B-AC78-F6FEE0B57B5D}" type="datetime1">
               <a:rPr lang="zh-CN" altLang="en-US" smtClean="0"/>
-              <a:t>2016/9/7</a:t>
+              <a:t>2016/9/17</a:t>
             </a:fld>
             <a:endParaRPr lang="zh-CN" altLang="en-US"/>
           </a:p>
@@ -8170,7 +8437,7 @@
           <a:p>
             <a:fld id="{B34AA640-87DE-403B-AC78-F6FEE0B57B5D}" type="datetime1">
               <a:rPr lang="zh-CN" altLang="en-US" smtClean="0"/>
-              <a:t>2016/9/7</a:t>
+              <a:t>2016/9/17</a:t>
             </a:fld>
             <a:endParaRPr lang="zh-CN" altLang="en-US"/>
           </a:p>
@@ -8352,7 +8619,7 @@
           <a:p>
             <a:fld id="{B34AA640-87DE-403B-AC78-F6FEE0B57B5D}" type="datetime1">
               <a:rPr lang="zh-CN" altLang="en-US" smtClean="0"/>
-              <a:t>2016/9/7</a:t>
+              <a:t>2016/9/17</a:t>
             </a:fld>
             <a:endParaRPr lang="zh-CN" altLang="en-US"/>
           </a:p>
@@ -8717,7 +8984,7 @@
           <a:p>
             <a:fld id="{B34AA640-87DE-403B-AC78-F6FEE0B57B5D}" type="datetime1">
               <a:rPr lang="zh-CN" altLang="en-US" smtClean="0"/>
-              <a:t>2016/9/7</a:t>
+              <a:t>2016/9/17</a:t>
             </a:fld>
             <a:endParaRPr lang="zh-CN" altLang="en-US"/>
           </a:p>

</xml_diff>